<commit_message>
added basic simulator layout with button and stuff.
</commit_message>
<xml_diff>
--- a/teams/aast/Sam/14-06-17/X10.pptx
+++ b/teams/aast/Sam/14-06-17/X10.pptx
@@ -111,6 +111,11 @@
       </a:defRPr>
     </a:lvl9pPr>
   </p:defaultTextStyle>
+  <p:extLst>
+    <p:ext uri="{EFAFB233-063F-42B5-8137-9DF3F51BA10A}">
+      <p15:sldGuideLst xmlns:p15="http://schemas.microsoft.com/office/powerpoint/2012/main"/>
+    </p:ext>
+  </p:extLst>
 </p:presentation>
 </file>
 
@@ -882,7 +887,7 @@
           <a:p>
             <a:fld id="{E4586826-7BCB-4736-9D19-BD4D40F2AABF}" type="slidenum">
               <a:rPr lang="en-US" smtClean="0"/>
-              <a:t>‹#›</a:t>
+              <a:t>‹Nr.›</a:t>
             </a:fld>
             <a:endParaRPr lang="en-US"/>
           </a:p>
@@ -1133,7 +1138,7 @@
           <a:p>
             <a:fld id="{E4586826-7BCB-4736-9D19-BD4D40F2AABF}" type="slidenum">
               <a:rPr lang="en-US" smtClean="0"/>
-              <a:t>‹#›</a:t>
+              <a:t>‹Nr.›</a:t>
             </a:fld>
             <a:endParaRPr lang="en-US"/>
           </a:p>
@@ -1447,7 +1452,7 @@
           <a:p>
             <a:fld id="{E4586826-7BCB-4736-9D19-BD4D40F2AABF}" type="slidenum">
               <a:rPr lang="en-US" smtClean="0"/>
-              <a:t>‹#›</a:t>
+              <a:t>‹Nr.›</a:t>
             </a:fld>
             <a:endParaRPr lang="en-US"/>
           </a:p>
@@ -1788,7 +1793,7 @@
           <a:p>
             <a:fld id="{E4586826-7BCB-4736-9D19-BD4D40F2AABF}" type="slidenum">
               <a:rPr lang="en-US" smtClean="0"/>
-              <a:t>‹#›</a:t>
+              <a:t>‹Nr.›</a:t>
             </a:fld>
             <a:endParaRPr lang="en-US"/>
           </a:p>
@@ -2102,7 +2107,7 @@
           <a:p>
             <a:fld id="{E4586826-7BCB-4736-9D19-BD4D40F2AABF}" type="slidenum">
               <a:rPr lang="en-US" smtClean="0"/>
-              <a:t>‹#›</a:t>
+              <a:t>‹Nr.›</a:t>
             </a:fld>
             <a:endParaRPr lang="en-US"/>
           </a:p>
@@ -2495,7 +2500,7 @@
           <a:p>
             <a:fld id="{E4586826-7BCB-4736-9D19-BD4D40F2AABF}" type="slidenum">
               <a:rPr lang="en-US" smtClean="0"/>
-              <a:t>‹#›</a:t>
+              <a:t>‹Nr.›</a:t>
             </a:fld>
             <a:endParaRPr lang="en-US"/>
           </a:p>
@@ -2665,7 +2670,7 @@
           <a:p>
             <a:fld id="{E4586826-7BCB-4736-9D19-BD4D40F2AABF}" type="slidenum">
               <a:rPr lang="en-US" smtClean="0"/>
-              <a:t>‹#›</a:t>
+              <a:t>‹Nr.›</a:t>
             </a:fld>
             <a:endParaRPr lang="en-US"/>
           </a:p>
@@ -2845,7 +2850,7 @@
           <a:p>
             <a:fld id="{E4586826-7BCB-4736-9D19-BD4D40F2AABF}" type="slidenum">
               <a:rPr lang="en-US" smtClean="0"/>
-              <a:t>‹#›</a:t>
+              <a:t>‹Nr.›</a:t>
             </a:fld>
             <a:endParaRPr lang="en-US"/>
           </a:p>
@@ -3021,7 +3026,7 @@
           <a:p>
             <a:fld id="{E4586826-7BCB-4736-9D19-BD4D40F2AABF}" type="slidenum">
               <a:rPr lang="en-US" smtClean="0"/>
-              <a:t>‹#›</a:t>
+              <a:t>‹Nr.›</a:t>
             </a:fld>
             <a:endParaRPr lang="en-US"/>
           </a:p>
@@ -3268,7 +3273,7 @@
           <a:p>
             <a:fld id="{E4586826-7BCB-4736-9D19-BD4D40F2AABF}" type="slidenum">
               <a:rPr lang="en-US" smtClean="0"/>
-              <a:t>‹#›</a:t>
+              <a:t>‹Nr.›</a:t>
             </a:fld>
             <a:endParaRPr lang="en-US"/>
           </a:p>
@@ -3500,7 +3505,7 @@
           <a:p>
             <a:fld id="{E4586826-7BCB-4736-9D19-BD4D40F2AABF}" type="slidenum">
               <a:rPr lang="en-US" smtClean="0"/>
-              <a:t>‹#›</a:t>
+              <a:t>‹Nr.›</a:t>
             </a:fld>
             <a:endParaRPr lang="en-US"/>
           </a:p>
@@ -3879,7 +3884,7 @@
           <a:p>
             <a:fld id="{E4586826-7BCB-4736-9D19-BD4D40F2AABF}" type="slidenum">
               <a:rPr lang="en-US" smtClean="0"/>
-              <a:t>‹#›</a:t>
+              <a:t>‹Nr.›</a:t>
             </a:fld>
             <a:endParaRPr lang="en-US"/>
           </a:p>
@@ -4007,7 +4012,7 @@
           <a:p>
             <a:fld id="{E4586826-7BCB-4736-9D19-BD4D40F2AABF}" type="slidenum">
               <a:rPr lang="en-US" smtClean="0"/>
-              <a:t>‹#›</a:t>
+              <a:t>‹Nr.›</a:t>
             </a:fld>
             <a:endParaRPr lang="en-US"/>
           </a:p>
@@ -4102,7 +4107,7 @@
           <a:p>
             <a:fld id="{E4586826-7BCB-4736-9D19-BD4D40F2AABF}" type="slidenum">
               <a:rPr lang="en-US" smtClean="0"/>
-              <a:t>‹#›</a:t>
+              <a:t>‹Nr.›</a:t>
             </a:fld>
             <a:endParaRPr lang="en-US"/>
           </a:p>
@@ -4357,7 +4362,7 @@
           <a:p>
             <a:fld id="{E4586826-7BCB-4736-9D19-BD4D40F2AABF}" type="slidenum">
               <a:rPr lang="en-US" smtClean="0"/>
-              <a:t>‹#›</a:t>
+              <a:t>‹Nr.›</a:t>
             </a:fld>
             <a:endParaRPr lang="en-US"/>
           </a:p>
@@ -4625,7 +4630,7 @@
           <a:p>
             <a:fld id="{E4586826-7BCB-4736-9D19-BD4D40F2AABF}" type="slidenum">
               <a:rPr lang="en-US" smtClean="0"/>
-              <a:t>‹#›</a:t>
+              <a:t>‹Nr.›</a:t>
             </a:fld>
             <a:endParaRPr lang="en-US"/>
           </a:p>
@@ -5402,7 +5407,7 @@
           <a:p>
             <a:fld id="{E4586826-7BCB-4736-9D19-BD4D40F2AABF}" type="slidenum">
               <a:rPr lang="en-US" smtClean="0"/>
-              <a:t>‹#›</a:t>
+              <a:t>‹Nr.›</a:t>
             </a:fld>
             <a:endParaRPr lang="en-US"/>
           </a:p>
@@ -6130,7 +6135,7 @@
         <p:spPr/>
         <p:txBody>
           <a:bodyPr>
-            <a:normAutofit/>
+            <a:normAutofit lnSpcReduction="10000"/>
           </a:bodyPr>
           <a:lstStyle/>
           <a:p>
@@ -6142,15 +6147,7 @@
           <a:p>
             <a:r>
               <a:rPr lang="en-US" dirty="0"/>
-              <a:t> the data is encoded on a 120 kHz carrier </a:t>
-            </a:r>
-            <a:r>
-              <a:rPr lang="en-US" dirty="0" err="1"/>
-              <a:t>frequence</a:t>
-            </a:r>
-            <a:r>
-              <a:rPr lang="en-US" dirty="0"/>
-              <a:t>, transmitted as short bursts</a:t>
+              <a:t> the data is encoded on a 120 kHz carrier frequency, transmitted as short bursts</a:t>
             </a:r>
           </a:p>
           <a:p>
@@ -6177,6 +6174,34 @@
               <a:rPr lang="en-US" dirty="0"/>
               <a:t>status may be: on/off, dimming level, temperature or other sensing reading.</a:t>
             </a:r>
+          </a:p>
+          <a:p>
+            <a:r>
+              <a:rPr lang="en-US" dirty="0"/>
+              <a:t>up to like 3 rooms</a:t>
+            </a:r>
+          </a:p>
+          <a:p>
+            <a:r>
+              <a:rPr lang="en-US" dirty="0"/>
+              <a:t>if two X10 signals are transmitted at the same </a:t>
+            </a:r>
+            <a:r>
+              <a:rPr lang="en-US" dirty="0">
+                <a:sym typeface="Wingdings" panose="05000000000000000000" pitchFamily="2" charset="2"/>
+              </a:rPr>
+              <a:t> collision</a:t>
+            </a:r>
+          </a:p>
+          <a:p>
+            <a:pPr lvl="1"/>
+            <a:r>
+              <a:rPr lang="en-US" dirty="0">
+                <a:sym typeface="Wingdings" panose="05000000000000000000" pitchFamily="2" charset="2"/>
+              </a:rPr>
+              <a:t>better devices can avoid those collisions</a:t>
+            </a:r>
+            <a:endParaRPr lang="en-US" dirty="0"/>
           </a:p>
         </p:txBody>
       </p:sp>

</xml_diff>